<commit_message>
Aanpassingen sprint presentatie + product backlog
</commit_message>
<xml_diff>
--- a/Presentaties/Sprint 1.pptx
+++ b/Presentaties/Sprint 1.pptx
@@ -9714,7 +9714,7 @@
           <a:p>
             <a:r>
               <a:rPr lang="nl-NL" dirty="0"/>
-              <a:t>Deze Taken zijn we nog niet aan toegekomen</a:t>
+              <a:t>Hier zijn we nog niet aan toegekomen</a:t>
             </a:r>
           </a:p>
         </p:txBody>
@@ -10374,23 +10374,6 @@
 </file>
 
 <file path=customXml/item1.xml><?xml version="1.0" encoding="utf-8"?>
-<p:properties xmlns:p="http://schemas.microsoft.com/office/2006/metadata/properties" xmlns:xsi="http://www.w3.org/2001/XMLSchema-instance" xmlns:pc="http://schemas.microsoft.com/office/infopath/2007/PartnerControls">
-  <documentManagement>
-    <_activity xmlns="8d5dcd13-9b93-4860-8686-258dec0e23be" xsi:nil="true"/>
-  </documentManagement>
-</p:properties>
-</file>
-
-<file path=customXml/item2.xml><?xml version="1.0" encoding="utf-8"?>
-<?mso-contentType ?>
-<FormTemplates xmlns="http://schemas.microsoft.com/sharepoint/v3/contenttype/forms">
-  <Display>DocumentLibraryForm</Display>
-  <Edit>DocumentLibraryForm</Edit>
-  <New>DocumentLibraryForm</New>
-</FormTemplates>
-</file>
-
-<file path=customXml/item3.xml><?xml version="1.0" encoding="utf-8"?>
 <ct:contentTypeSchema xmlns:ct="http://schemas.microsoft.com/office/2006/metadata/contentType" xmlns:ma="http://schemas.microsoft.com/office/2006/metadata/properties/metaAttributes" ct:_="" ma:_="" ma:contentTypeName="Document" ma:contentTypeID="0x01010079D7DB9D69D51D4199EBB83E098F6C13" ma:contentTypeVersion="12" ma:contentTypeDescription="Create a new document." ma:contentTypeScope="" ma:versionID="ceb163bb5f87e201cdc653da3b4d8be7">
   <xsd:schema xmlns:xsd="http://www.w3.org/2001/XMLSchema" xmlns:xs="http://www.w3.org/2001/XMLSchema" xmlns:p="http://schemas.microsoft.com/office/2006/metadata/properties" xmlns:ns3="8d5dcd13-9b93-4860-8686-258dec0e23be" targetNamespace="http://schemas.microsoft.com/office/2006/metadata/properties" ma:root="true" ma:fieldsID="28cc82626ae761b4ac7541494d6f1d1e" ns3:_="">
     <xsd:import namespace="8d5dcd13-9b93-4860-8686-258dec0e23be"/>
@@ -10584,31 +10567,24 @@
 </ct:contentTypeSchema>
 </file>
 
-<file path=customXml/itemProps1.xml><?xml version="1.0" encoding="utf-8"?>
-<ds:datastoreItem xmlns:ds="http://schemas.openxmlformats.org/officeDocument/2006/customXml" ds:itemID="{6BE63DC0-0E79-4D45-AB99-081F8145E24C}">
-  <ds:schemaRefs>
-    <ds:schemaRef ds:uri="http://purl.org/dc/terms/"/>
-    <ds:schemaRef ds:uri="http://schemas.microsoft.com/office/infopath/2007/PartnerControls"/>
-    <ds:schemaRef ds:uri="http://schemas.openxmlformats.org/package/2006/metadata/core-properties"/>
-    <ds:schemaRef ds:uri="http://purl.org/dc/elements/1.1/"/>
-    <ds:schemaRef ds:uri="http://schemas.microsoft.com/office/2006/documentManagement/types"/>
-    <ds:schemaRef ds:uri="http://www.w3.org/XML/1998/namespace"/>
-    <ds:schemaRef ds:uri="8d5dcd13-9b93-4860-8686-258dec0e23be"/>
-    <ds:schemaRef ds:uri="http://schemas.microsoft.com/office/2006/metadata/properties"/>
-    <ds:schemaRef ds:uri="http://purl.org/dc/dcmitype/"/>
-  </ds:schemaRefs>
-</ds:datastoreItem>
+<file path=customXml/item2.xml><?xml version="1.0" encoding="utf-8"?>
+<?mso-contentType ?>
+<FormTemplates xmlns="http://schemas.microsoft.com/sharepoint/v3/contenttype/forms">
+  <Display>DocumentLibraryForm</Display>
+  <Edit>DocumentLibraryForm</Edit>
+  <New>DocumentLibraryForm</New>
+</FormTemplates>
 </file>
 
-<file path=customXml/itemProps2.xml><?xml version="1.0" encoding="utf-8"?>
-<ds:datastoreItem xmlns:ds="http://schemas.openxmlformats.org/officeDocument/2006/customXml" ds:itemID="{33D4CFAA-434D-4462-B62D-1E23E4045646}">
-  <ds:schemaRefs>
-    <ds:schemaRef ds:uri="http://schemas.microsoft.com/sharepoint/v3/contenttype/forms"/>
-  </ds:schemaRefs>
-</ds:datastoreItem>
+<file path=customXml/item3.xml><?xml version="1.0" encoding="utf-8"?>
+<p:properties xmlns:p="http://schemas.microsoft.com/office/2006/metadata/properties" xmlns:xsi="http://www.w3.org/2001/XMLSchema-instance" xmlns:pc="http://schemas.microsoft.com/office/infopath/2007/PartnerControls">
+  <documentManagement>
+    <_activity xmlns="8d5dcd13-9b93-4860-8686-258dec0e23be" xsi:nil="true"/>
+  </documentManagement>
+</p:properties>
 </file>
 
-<file path=customXml/itemProps3.xml><?xml version="1.0" encoding="utf-8"?>
+<file path=customXml/itemProps1.xml><?xml version="1.0" encoding="utf-8"?>
 <ds:datastoreItem xmlns:ds="http://schemas.openxmlformats.org/officeDocument/2006/customXml" ds:itemID="{7685628E-9CEE-488E-843E-DA0262089D08}">
   <ds:schemaRefs>
     <ds:schemaRef ds:uri="http://schemas.microsoft.com/office/2006/metadata/contentType"/>
@@ -10624,4 +10600,28 @@
     <ds:schemaRef ds:uri="http://schemas.microsoft.com/internal/obd"/>
   </ds:schemaRefs>
 </ds:datastoreItem>
+</file>
+
+<file path=customXml/itemProps2.xml><?xml version="1.0" encoding="utf-8"?>
+<ds:datastoreItem xmlns:ds="http://schemas.openxmlformats.org/officeDocument/2006/customXml" ds:itemID="{33D4CFAA-434D-4462-B62D-1E23E4045646}">
+  <ds:schemaRefs>
+    <ds:schemaRef ds:uri="http://schemas.microsoft.com/sharepoint/v3/contenttype/forms"/>
+  </ds:schemaRefs>
+</ds:datastoreItem>
+</file>
+
+<file path=customXml/itemProps3.xml><?xml version="1.0" encoding="utf-8"?>
+<ds:datastoreItem xmlns:ds="http://schemas.openxmlformats.org/officeDocument/2006/customXml" ds:itemID="{6BE63DC0-0E79-4D45-AB99-081F8145E24C}">
+  <ds:schemaRefs>
+    <ds:schemaRef ds:uri="http://purl.org/dc/terms/"/>
+    <ds:schemaRef ds:uri="http://schemas.microsoft.com/office/infopath/2007/PartnerControls"/>
+    <ds:schemaRef ds:uri="http://schemas.openxmlformats.org/package/2006/metadata/core-properties"/>
+    <ds:schemaRef ds:uri="http://purl.org/dc/elements/1.1/"/>
+    <ds:schemaRef ds:uri="http://schemas.microsoft.com/office/2006/documentManagement/types"/>
+    <ds:schemaRef ds:uri="http://www.w3.org/XML/1998/namespace"/>
+    <ds:schemaRef ds:uri="8d5dcd13-9b93-4860-8686-258dec0e23be"/>
+    <ds:schemaRef ds:uri="http://schemas.microsoft.com/office/2006/metadata/properties"/>
+    <ds:schemaRef ds:uri="http://purl.org/dc/dcmitype/"/>
+  </ds:schemaRefs>
+</ds:datastoreItem>
 </file>
</xml_diff>

<commit_message>
Aanpassingen backlog en presentatie :P
</commit_message>
<xml_diff>
--- a/Presentaties/Sprint 1.pptx
+++ b/Presentaties/Sprint 1.pptx
@@ -1035,10 +1035,10 @@
         <a:lstStyle/>
         <a:p>
           <a:r>
-            <a:rPr lang="nl-NL"/>
+            <a:rPr lang="nl-NL" dirty="0" err="1"/>
             <a:t>Retrospective</a:t>
           </a:r>
-          <a:endParaRPr lang="en-US"/>
+          <a:endParaRPr lang="en-US" dirty="0"/>
         </a:p>
       </dgm:t>
     </dgm:pt>
@@ -1764,10 +1764,10 @@
             <a:buNone/>
           </a:pPr>
           <a:r>
-            <a:rPr lang="nl-NL" sz="4200" kern="1200"/>
+            <a:rPr lang="nl-NL" sz="4200" kern="1200" dirty="0" err="1"/>
             <a:t>Retrospective</a:t>
           </a:r>
-          <a:endParaRPr lang="en-US" sz="4200" kern="1200"/>
+          <a:endParaRPr lang="en-US" sz="4200" kern="1200" dirty="0"/>
         </a:p>
       </dsp:txBody>
       <dsp:txXfrm>
@@ -9476,6 +9476,29 @@
 <file path=ppt/slides/slide3.xml><?xml version="1.0" encoding="utf-8"?>
 <p:sld xmlns:a="http://schemas.openxmlformats.org/drawingml/2006/main" xmlns:r="http://schemas.openxmlformats.org/officeDocument/2006/relationships" xmlns:p="http://schemas.openxmlformats.org/presentationml/2006/main">
   <p:cSld>
+    <p:bg>
+      <p:bgPr>
+        <a:blipFill rotWithShape="1">
+          <a:blip r:embed="rId2">
+            <a:duotone>
+              <a:schemeClr val="bg2">
+                <a:shade val="28000"/>
+                <a:satMod val="94000"/>
+                <a:lumMod val="20000"/>
+              </a:schemeClr>
+              <a:schemeClr val="bg2">
+                <a:tint val="94000"/>
+                <a:shade val="84000"/>
+                <a:satMod val="148000"/>
+                <a:lumMod val="114000"/>
+              </a:schemeClr>
+            </a:duotone>
+          </a:blip>
+          <a:stretch/>
+        </a:blipFill>
+        <a:effectLst/>
+      </p:bgPr>
+    </p:bg>
     <p:spTree>
       <p:nvGrpSpPr>
         <p:cNvPr id="1" name=""/>
@@ -9490,6 +9513,44 @@
           <a:chExt cx="0" cy="0"/>
         </a:xfrm>
       </p:grpSpPr>
+      <p:pic>
+        <p:nvPicPr>
+          <p:cNvPr id="9" name="Picture 8" descr="A white box with four shelves&#10;&#10;AI-generated content may be incorrect.">
+            <a:extLst>
+              <a:ext uri="{FF2B5EF4-FFF2-40B4-BE49-F238E27FC236}">
+                <a16:creationId xmlns:a16="http://schemas.microsoft.com/office/drawing/2014/main" id="{2AA1C426-5BA6-A289-9E18-0BF408E595D8}"/>
+              </a:ext>
+            </a:extLst>
+          </p:cNvPr>
+          <p:cNvPicPr>
+            <a:picLocks noChangeAspect="1"/>
+          </p:cNvPicPr>
+          <p:nvPr/>
+        </p:nvPicPr>
+        <p:blipFill>
+          <a:blip r:embed="rId3">
+            <a:alphaModFix amt="15000"/>
+            <a:extLst>
+              <a:ext uri="{28A0092B-C50C-407E-A947-70E740481C1C}">
+                <a14:useLocalDpi xmlns:a14="http://schemas.microsoft.com/office/drawing/2010/main" val="0"/>
+              </a:ext>
+            </a:extLst>
+          </a:blip>
+          <a:srcRect/>
+          <a:stretch>
+            <a:fillRect/>
+          </a:stretch>
+        </p:blipFill>
+        <p:spPr>
+          <a:xfrm>
+            <a:off x="20" y="10"/>
+            <a:ext cx="12191980" cy="6857990"/>
+          </a:xfrm>
+          <a:prstGeom prst="rect">
+            <a:avLst/>
+          </a:prstGeom>
+        </p:spPr>
+      </p:pic>
       <p:sp>
         <p:nvSpPr>
           <p:cNvPr id="2" name="Title 1">
@@ -9506,9 +9567,16 @@
             <p:ph type="title"/>
           </p:nvPr>
         </p:nvSpPr>
-        <p:spPr/>
-        <p:txBody>
-          <a:bodyPr/>
+        <p:spPr>
+          <a:xfrm>
+            <a:off x="1141413" y="609600"/>
+            <a:ext cx="9905998" cy="1905000"/>
+          </a:xfrm>
+        </p:spPr>
+        <p:txBody>
+          <a:bodyPr>
+            <a:normAutofit/>
+          </a:bodyPr>
           <a:lstStyle/>
           <a:p>
             <a:r>
@@ -9534,9 +9602,16 @@
             <p:ph idx="1"/>
           </p:nvPr>
         </p:nvSpPr>
-        <p:spPr/>
-        <p:txBody>
-          <a:bodyPr/>
+        <p:spPr>
+          <a:xfrm>
+            <a:off x="1141413" y="2666999"/>
+            <a:ext cx="9905998" cy="3124201"/>
+          </a:xfrm>
+        </p:spPr>
+        <p:txBody>
+          <a:bodyPr>
+            <a:normAutofit/>
+          </a:bodyPr>
           <a:lstStyle/>
           <a:p>
             <a:r>
@@ -9553,10 +9628,7 @@
               <a:rPr lang="nl-NL" dirty="0" err="1"/>
               <a:t>Backlog</a:t>
             </a:r>
-            <a:r>
-              <a:rPr lang="nl-NL" dirty="0"/>
-              <a:t>	</a:t>
-            </a:r>
+            <a:endParaRPr lang="nl-NL" dirty="0"/>
           </a:p>
           <a:p>
             <a:r>
@@ -9569,6 +9641,19 @@
               <a:rPr lang="nl-NL" dirty="0"/>
               <a:t>Samenwerkingsovereenkomst</a:t>
             </a:r>
+          </a:p>
+          <a:p>
+            <a:r>
+              <a:rPr lang="nl-NL" dirty="0" err="1"/>
+              <a:t>Requirements</a:t>
+            </a:r>
+            <a:r>
+              <a:rPr lang="nl-NL" dirty="0"/>
+              <a:t> opstellen</a:t>
+            </a:r>
+          </a:p>
+          <a:p>
+            <a:endParaRPr lang="nl-NL" dirty="0"/>
           </a:p>
         </p:txBody>
       </p:sp>
@@ -9653,7 +9738,15 @@
           <a:p>
             <a:r>
               <a:rPr lang="nl-NL" dirty="0"/>
-              <a:t>Accelerometer voor positiebepaling</a:t>
+              <a:t>Accelerometer voor positiebepaling + </a:t>
+            </a:r>
+            <a:r>
+              <a:rPr lang="nl-NL" dirty="0" err="1"/>
+              <a:t>kleinschaals</a:t>
+            </a:r>
+            <a:r>
+              <a:rPr lang="nl-NL" dirty="0"/>
+              <a:t> platform</a:t>
             </a:r>
           </a:p>
           <a:p>
@@ -9675,7 +9768,7 @@
 </file>
 
 <file path=ppt/slides/slide5.xml><?xml version="1.0" encoding="utf-8"?>
-<p:sld xmlns:a="http://schemas.openxmlformats.org/drawingml/2006/main" xmlns:r="http://schemas.openxmlformats.org/officeDocument/2006/relationships" xmlns:p="http://schemas.openxmlformats.org/presentationml/2006/main">
+<p:sld xmlns:a="http://schemas.openxmlformats.org/drawingml/2006/main" xmlns:r="http://schemas.openxmlformats.org/officeDocument/2006/relationships" xmlns:p="http://schemas.openxmlformats.org/presentationml/2006/main" show="0">
   <p:cSld>
     <p:spTree>
       <p:nvGrpSpPr>
@@ -9714,7 +9807,7 @@
           <a:p>
             <a:r>
               <a:rPr lang="nl-NL" dirty="0"/>
-              <a:t>Hier zijn we nog niet aan toegekomen</a:t>
+              <a:t>Dit is nog niet klaar, maar…</a:t>
             </a:r>
           </a:p>
         </p:txBody>
@@ -9767,6 +9860,29 @@
 <file path=ppt/slides/slide6.xml><?xml version="1.0" encoding="utf-8"?>
 <p:sld xmlns:a="http://schemas.openxmlformats.org/drawingml/2006/main" xmlns:r="http://schemas.openxmlformats.org/officeDocument/2006/relationships" xmlns:p="http://schemas.openxmlformats.org/presentationml/2006/main">
   <p:cSld>
+    <p:bg>
+      <p:bgPr>
+        <a:blipFill rotWithShape="1">
+          <a:blip r:embed="rId2">
+            <a:duotone>
+              <a:schemeClr val="bg2">
+                <a:shade val="28000"/>
+                <a:satMod val="94000"/>
+                <a:lumMod val="20000"/>
+              </a:schemeClr>
+              <a:schemeClr val="bg2">
+                <a:tint val="94000"/>
+                <a:shade val="84000"/>
+                <a:satMod val="148000"/>
+                <a:lumMod val="114000"/>
+              </a:schemeClr>
+            </a:duotone>
+          </a:blip>
+          <a:stretch/>
+        </a:blipFill>
+        <a:effectLst/>
+      </p:bgPr>
+    </p:bg>
     <p:spTree>
       <p:nvGrpSpPr>
         <p:cNvPr id="1" name=""/>
@@ -9781,6 +9897,44 @@
           <a:chExt cx="0" cy="0"/>
         </a:xfrm>
       </p:grpSpPr>
+      <p:pic>
+        <p:nvPicPr>
+          <p:cNvPr id="5" name="Picture 4" descr="A blue circuit board with many small holes&#10;&#10;AI-generated content may be incorrect.">
+            <a:extLst>
+              <a:ext uri="{FF2B5EF4-FFF2-40B4-BE49-F238E27FC236}">
+                <a16:creationId xmlns:a16="http://schemas.microsoft.com/office/drawing/2014/main" id="{D71CE9BD-FAB9-AE33-96D9-2A7A71998FBE}"/>
+              </a:ext>
+            </a:extLst>
+          </p:cNvPr>
+          <p:cNvPicPr>
+            <a:picLocks noChangeAspect="1"/>
+          </p:cNvPicPr>
+          <p:nvPr/>
+        </p:nvPicPr>
+        <p:blipFill>
+          <a:blip r:embed="rId3">
+            <a:alphaModFix amt="15000"/>
+            <a:extLst>
+              <a:ext uri="{28A0092B-C50C-407E-A947-70E740481C1C}">
+                <a14:useLocalDpi xmlns:a14="http://schemas.microsoft.com/office/drawing/2010/main" val="0"/>
+              </a:ext>
+            </a:extLst>
+          </a:blip>
+          <a:srcRect t="3131" b="27425"/>
+          <a:stretch>
+            <a:fillRect/>
+          </a:stretch>
+        </p:blipFill>
+        <p:spPr>
+          <a:xfrm>
+            <a:off x="20" y="10"/>
+            <a:ext cx="12191980" cy="6857990"/>
+          </a:xfrm>
+          <a:prstGeom prst="rect">
+            <a:avLst/>
+          </a:prstGeom>
+        </p:spPr>
+      </p:pic>
       <p:sp>
         <p:nvSpPr>
           <p:cNvPr id="2" name="Title 1">
@@ -9797,18 +9951,21 @@
             <p:ph type="title"/>
           </p:nvPr>
         </p:nvSpPr>
-        <p:spPr/>
-        <p:txBody>
-          <a:bodyPr/>
+        <p:spPr>
+          <a:xfrm>
+            <a:off x="1141413" y="609600"/>
+            <a:ext cx="9905998" cy="1905000"/>
+          </a:xfrm>
+        </p:spPr>
+        <p:txBody>
+          <a:bodyPr>
+            <a:normAutofit/>
+          </a:bodyPr>
           <a:lstStyle/>
           <a:p>
             <a:r>
-              <a:rPr lang="nl-NL" dirty="0"/>
-              <a:t>Afgemaakte User </a:t>
-            </a:r>
-            <a:r>
-              <a:rPr lang="nl-NL" dirty="0" err="1"/>
-              <a:t>Stories</a:t>
+              <a:rPr lang="nl-NL"/>
+              <a:t>Afgemaakte User Stories</a:t>
             </a:r>
             <a:endParaRPr lang="nl-NL" dirty="0"/>
           </a:p>
@@ -9830,13 +9987,20 @@
             <p:ph idx="1"/>
           </p:nvPr>
         </p:nvSpPr>
-        <p:spPr/>
-        <p:txBody>
-          <a:bodyPr/>
+        <p:spPr>
+          <a:xfrm>
+            <a:off x="1141413" y="2666999"/>
+            <a:ext cx="9905998" cy="3124201"/>
+          </a:xfrm>
+        </p:spPr>
+        <p:txBody>
+          <a:bodyPr>
+            <a:normAutofit/>
+          </a:bodyPr>
           <a:lstStyle/>
           <a:p>
             <a:r>
-              <a:rPr lang="nl-NL" dirty="0"/>
+              <a:rPr lang="nl-NL"/>
               <a:t>“Als systeem wil ik sensordata waterpas hebben, zodat ik altijd nauwkeurige en realistische lezingen krijg.”</a:t>
             </a:r>
           </a:p>
@@ -9927,13 +10091,19 @@
           <a:p>
             <a:r>
               <a:rPr lang="nl-NL" dirty="0"/>
-              <a:t>Teamwork</a:t>
+              <a:t>Teamwork - communicatie</a:t>
             </a:r>
           </a:p>
           <a:p>
             <a:r>
               <a:rPr lang="nl-NL" dirty="0"/>
               <a:t>Taakverdeling</a:t>
+            </a:r>
+          </a:p>
+          <a:p>
+            <a:r>
+              <a:rPr lang="nl-NL" dirty="0"/>
+              <a:t>Tijdsindeling</a:t>
             </a:r>
           </a:p>
         </p:txBody>
@@ -10017,7 +10187,34 @@
           <a:bodyPr/>
           <a:lstStyle/>
           <a:p>
-            <a:endParaRPr lang="nl-NL" dirty="0"/>
+            <a:r>
+              <a:rPr lang="nl-NL" dirty="0"/>
+              <a:t>Onderzoeken manieren hoogteverplaatsing boerderij</a:t>
+            </a:r>
+          </a:p>
+          <a:p>
+            <a:r>
+              <a:rPr lang="nl-NL" dirty="0"/>
+              <a:t>Pompen onderzoeken</a:t>
+            </a:r>
+          </a:p>
+          <a:p>
+            <a:r>
+              <a:rPr lang="nl-NL" dirty="0"/>
+              <a:t>Onderzoeken benodigde kracht voor verplaatsing</a:t>
+            </a:r>
+          </a:p>
+          <a:p>
+            <a:r>
+              <a:rPr lang="nl-NL" dirty="0"/>
+              <a:t>Schaalmodel uitbreiden</a:t>
+            </a:r>
+          </a:p>
+          <a:p>
+            <a:r>
+              <a:rPr lang="nl-NL" dirty="0"/>
+              <a:t>Waterdichtheid onderzoeken</a:t>
+            </a:r>
           </a:p>
         </p:txBody>
       </p:sp>
@@ -10374,6 +10571,23 @@
 </file>
 
 <file path=customXml/item1.xml><?xml version="1.0" encoding="utf-8"?>
+<p:properties xmlns:p="http://schemas.microsoft.com/office/2006/metadata/properties" xmlns:xsi="http://www.w3.org/2001/XMLSchema-instance" xmlns:pc="http://schemas.microsoft.com/office/infopath/2007/PartnerControls">
+  <documentManagement>
+    <_activity xmlns="8d5dcd13-9b93-4860-8686-258dec0e23be" xsi:nil="true"/>
+  </documentManagement>
+</p:properties>
+</file>
+
+<file path=customXml/item2.xml><?xml version="1.0" encoding="utf-8"?>
+<?mso-contentType ?>
+<FormTemplates xmlns="http://schemas.microsoft.com/sharepoint/v3/contenttype/forms">
+  <Display>DocumentLibraryForm</Display>
+  <Edit>DocumentLibraryForm</Edit>
+  <New>DocumentLibraryForm</New>
+</FormTemplates>
+</file>
+
+<file path=customXml/item3.xml><?xml version="1.0" encoding="utf-8"?>
 <ct:contentTypeSchema xmlns:ct="http://schemas.microsoft.com/office/2006/metadata/contentType" xmlns:ma="http://schemas.microsoft.com/office/2006/metadata/properties/metaAttributes" ct:_="" ma:_="" ma:contentTypeName="Document" ma:contentTypeID="0x01010079D7DB9D69D51D4199EBB83E098F6C13" ma:contentTypeVersion="12" ma:contentTypeDescription="Create a new document." ma:contentTypeScope="" ma:versionID="ceb163bb5f87e201cdc653da3b4d8be7">
   <xsd:schema xmlns:xsd="http://www.w3.org/2001/XMLSchema" xmlns:xs="http://www.w3.org/2001/XMLSchema" xmlns:p="http://schemas.microsoft.com/office/2006/metadata/properties" xmlns:ns3="8d5dcd13-9b93-4860-8686-258dec0e23be" targetNamespace="http://schemas.microsoft.com/office/2006/metadata/properties" ma:root="true" ma:fieldsID="28cc82626ae761b4ac7541494d6f1d1e" ns3:_="">
     <xsd:import namespace="8d5dcd13-9b93-4860-8686-258dec0e23be"/>
@@ -10567,24 +10781,31 @@
 </ct:contentTypeSchema>
 </file>
 
-<file path=customXml/item2.xml><?xml version="1.0" encoding="utf-8"?>
-<?mso-contentType ?>
-<FormTemplates xmlns="http://schemas.microsoft.com/sharepoint/v3/contenttype/forms">
-  <Display>DocumentLibraryForm</Display>
-  <Edit>DocumentLibraryForm</Edit>
-  <New>DocumentLibraryForm</New>
-</FormTemplates>
+<file path=customXml/itemProps1.xml><?xml version="1.0" encoding="utf-8"?>
+<ds:datastoreItem xmlns:ds="http://schemas.openxmlformats.org/officeDocument/2006/customXml" ds:itemID="{6BE63DC0-0E79-4D45-AB99-081F8145E24C}">
+  <ds:schemaRefs>
+    <ds:schemaRef ds:uri="http://purl.org/dc/terms/"/>
+    <ds:schemaRef ds:uri="http://schemas.microsoft.com/office/infopath/2007/PartnerControls"/>
+    <ds:schemaRef ds:uri="http://schemas.openxmlformats.org/package/2006/metadata/core-properties"/>
+    <ds:schemaRef ds:uri="http://purl.org/dc/elements/1.1/"/>
+    <ds:schemaRef ds:uri="http://schemas.microsoft.com/office/2006/documentManagement/types"/>
+    <ds:schemaRef ds:uri="http://www.w3.org/XML/1998/namespace"/>
+    <ds:schemaRef ds:uri="8d5dcd13-9b93-4860-8686-258dec0e23be"/>
+    <ds:schemaRef ds:uri="http://schemas.microsoft.com/office/2006/metadata/properties"/>
+    <ds:schemaRef ds:uri="http://purl.org/dc/dcmitype/"/>
+  </ds:schemaRefs>
+</ds:datastoreItem>
 </file>
 
-<file path=customXml/item3.xml><?xml version="1.0" encoding="utf-8"?>
-<p:properties xmlns:p="http://schemas.microsoft.com/office/2006/metadata/properties" xmlns:xsi="http://www.w3.org/2001/XMLSchema-instance" xmlns:pc="http://schemas.microsoft.com/office/infopath/2007/PartnerControls">
-  <documentManagement>
-    <_activity xmlns="8d5dcd13-9b93-4860-8686-258dec0e23be" xsi:nil="true"/>
-  </documentManagement>
-</p:properties>
+<file path=customXml/itemProps2.xml><?xml version="1.0" encoding="utf-8"?>
+<ds:datastoreItem xmlns:ds="http://schemas.openxmlformats.org/officeDocument/2006/customXml" ds:itemID="{33D4CFAA-434D-4462-B62D-1E23E4045646}">
+  <ds:schemaRefs>
+    <ds:schemaRef ds:uri="http://schemas.microsoft.com/sharepoint/v3/contenttype/forms"/>
+  </ds:schemaRefs>
+</ds:datastoreItem>
 </file>
 
-<file path=customXml/itemProps1.xml><?xml version="1.0" encoding="utf-8"?>
+<file path=customXml/itemProps3.xml><?xml version="1.0" encoding="utf-8"?>
 <ds:datastoreItem xmlns:ds="http://schemas.openxmlformats.org/officeDocument/2006/customXml" ds:itemID="{7685628E-9CEE-488E-843E-DA0262089D08}">
   <ds:schemaRefs>
     <ds:schemaRef ds:uri="http://schemas.microsoft.com/office/2006/metadata/contentType"/>
@@ -10600,28 +10821,4 @@
     <ds:schemaRef ds:uri="http://schemas.microsoft.com/internal/obd"/>
   </ds:schemaRefs>
 </ds:datastoreItem>
-</file>
-
-<file path=customXml/itemProps2.xml><?xml version="1.0" encoding="utf-8"?>
-<ds:datastoreItem xmlns:ds="http://schemas.openxmlformats.org/officeDocument/2006/customXml" ds:itemID="{33D4CFAA-434D-4462-B62D-1E23E4045646}">
-  <ds:schemaRefs>
-    <ds:schemaRef ds:uri="http://schemas.microsoft.com/sharepoint/v3/contenttype/forms"/>
-  </ds:schemaRefs>
-</ds:datastoreItem>
-</file>
-
-<file path=customXml/itemProps3.xml><?xml version="1.0" encoding="utf-8"?>
-<ds:datastoreItem xmlns:ds="http://schemas.openxmlformats.org/officeDocument/2006/customXml" ds:itemID="{6BE63DC0-0E79-4D45-AB99-081F8145E24C}">
-  <ds:schemaRefs>
-    <ds:schemaRef ds:uri="http://purl.org/dc/terms/"/>
-    <ds:schemaRef ds:uri="http://schemas.microsoft.com/office/infopath/2007/PartnerControls"/>
-    <ds:schemaRef ds:uri="http://schemas.openxmlformats.org/package/2006/metadata/core-properties"/>
-    <ds:schemaRef ds:uri="http://purl.org/dc/elements/1.1/"/>
-    <ds:schemaRef ds:uri="http://schemas.microsoft.com/office/2006/documentManagement/types"/>
-    <ds:schemaRef ds:uri="http://www.w3.org/XML/1998/namespace"/>
-    <ds:schemaRef ds:uri="8d5dcd13-9b93-4860-8686-258dec0e23be"/>
-    <ds:schemaRef ds:uri="http://schemas.microsoft.com/office/2006/metadata/properties"/>
-    <ds:schemaRef ds:uri="http://purl.org/dc/dcmitype/"/>
-  </ds:schemaRefs>
-</ds:datastoreItem>
 </file>
</xml_diff>

<commit_message>
Update sprint 1 presentatie
</commit_message>
<xml_diff>
--- a/Presentaties/Sprint 1.pptx
+++ b/Presentaties/Sprint 1.pptx
@@ -9515,7 +9515,7 @@
       </p:grpSpPr>
       <p:pic>
         <p:nvPicPr>
-          <p:cNvPr id="9" name="Picture 8" descr="A white box with four shelves&#10;&#10;AI-generated content may be incorrect.">
+          <p:cNvPr id="9" name="Picture 8" descr="Cows eating hay in a barn&#10;&#10;AI-generated content may be incorrect.">
             <a:extLst>
               <a:ext uri="{FF2B5EF4-FFF2-40B4-BE49-F238E27FC236}">
                 <a16:creationId xmlns:a16="http://schemas.microsoft.com/office/drawing/2014/main" id="{2AA1C426-5BA6-A289-9E18-0BF408E595D8}"/>
@@ -9536,7 +9536,7 @@
               </a:ext>
             </a:extLst>
           </a:blip>
-          <a:srcRect/>
+          <a:srcRect t="3362" b="21638"/>
           <a:stretch>
             <a:fillRect/>
           </a:stretch>
@@ -9604,7 +9604,7 @@
         </p:nvSpPr>
         <p:spPr>
           <a:xfrm>
-            <a:off x="1141413" y="2666999"/>
+            <a:off x="991511" y="1866899"/>
             <a:ext cx="9905998" cy="3124201"/>
           </a:xfrm>
         </p:spPr>
@@ -9653,10 +9653,56 @@
             </a:r>
           </a:p>
           <a:p>
+            <a:r>
+              <a:rPr lang="nl-NL" dirty="0"/>
+              <a:t>Onderzoeken benodigde kracht voor verplaatsing</a:t>
+            </a:r>
+          </a:p>
+          <a:p>
             <a:endParaRPr lang="nl-NL" dirty="0"/>
           </a:p>
         </p:txBody>
       </p:sp>
+      <p:pic>
+        <p:nvPicPr>
+          <p:cNvPr id="5" name="Picture 4">
+            <a:extLst>
+              <a:ext uri="{FF2B5EF4-FFF2-40B4-BE49-F238E27FC236}">
+                <a16:creationId xmlns:a16="http://schemas.microsoft.com/office/drawing/2014/main" id="{0B9AC2DB-E938-0D0B-3AA8-5C6D2FD99270}"/>
+              </a:ext>
+            </a:extLst>
+          </p:cNvPr>
+          <p:cNvPicPr>
+            <a:picLocks noChangeAspect="1"/>
+          </p:cNvPicPr>
+          <p:nvPr/>
+        </p:nvPicPr>
+        <p:blipFill>
+          <a:blip r:embed="rId4">
+            <a:alphaModFix amt="64000"/>
+          </a:blip>
+          <a:stretch>
+            <a:fillRect/>
+          </a:stretch>
+        </p:blipFill>
+        <p:spPr>
+          <a:xfrm>
+            <a:off x="738837" y="4565362"/>
+            <a:ext cx="8317043" cy="2292638"/>
+          </a:xfrm>
+          <a:prstGeom prst="rect">
+            <a:avLst/>
+          </a:prstGeom>
+          <a:noFill/>
+          <a:ln>
+            <a:noFill/>
+          </a:ln>
+          <a:effectLst>
+            <a:reflection stA="18000" endPos="65000" dist="50800" dir="5400000" sy="-100000" algn="bl" rotWithShape="0"/>
+            <a:softEdge rad="38100"/>
+          </a:effectLst>
+        </p:spPr>
+      </p:pic>
     </p:spTree>
     <p:extLst>
       <p:ext uri="{BB962C8B-B14F-4D97-AF65-F5344CB8AC3E}">
@@ -10000,7 +10046,7 @@
           <a:lstStyle/>
           <a:p>
             <a:r>
-              <a:rPr lang="nl-NL"/>
+              <a:rPr lang="nl-NL" dirty="0"/>
               <a:t>“Als systeem wil ik sensordata waterpas hebben, zodat ik altijd nauwkeurige en realistische lezingen krijg.”</a:t>
             </a:r>
           </a:p>
@@ -10226,12 +10272,6 @@
             <a:r>
               <a:rPr lang="nl-NL" dirty="0"/>
               <a:t>Pompen onderzoeken</a:t>
-            </a:r>
-          </a:p>
-          <a:p>
-            <a:r>
-              <a:rPr lang="nl-NL" dirty="0"/>
-              <a:t>Onderzoeken benodigde kracht voor verplaatsing</a:t>
             </a:r>
           </a:p>
           <a:p>
@@ -10601,6 +10641,23 @@
 </file>
 
 <file path=customXml/item1.xml><?xml version="1.0" encoding="utf-8"?>
+<p:properties xmlns:p="http://schemas.microsoft.com/office/2006/metadata/properties" xmlns:xsi="http://www.w3.org/2001/XMLSchema-instance" xmlns:pc="http://schemas.microsoft.com/office/infopath/2007/PartnerControls">
+  <documentManagement>
+    <_activity xmlns="8d5dcd13-9b93-4860-8686-258dec0e23be" xsi:nil="true"/>
+  </documentManagement>
+</p:properties>
+</file>
+
+<file path=customXml/item2.xml><?xml version="1.0" encoding="utf-8"?>
+<?mso-contentType ?>
+<FormTemplates xmlns="http://schemas.microsoft.com/sharepoint/v3/contenttype/forms">
+  <Display>DocumentLibraryForm</Display>
+  <Edit>DocumentLibraryForm</Edit>
+  <New>DocumentLibraryForm</New>
+</FormTemplates>
+</file>
+
+<file path=customXml/item3.xml><?xml version="1.0" encoding="utf-8"?>
 <ct:contentTypeSchema xmlns:ct="http://schemas.microsoft.com/office/2006/metadata/contentType" xmlns:ma="http://schemas.microsoft.com/office/2006/metadata/properties/metaAttributes" ct:_="" ma:_="" ma:contentTypeName="Document" ma:contentTypeID="0x01010079D7DB9D69D51D4199EBB83E098F6C13" ma:contentTypeVersion="12" ma:contentTypeDescription="Create a new document." ma:contentTypeScope="" ma:versionID="ceb163bb5f87e201cdc653da3b4d8be7">
   <xsd:schema xmlns:xsd="http://www.w3.org/2001/XMLSchema" xmlns:xs="http://www.w3.org/2001/XMLSchema" xmlns:p="http://schemas.microsoft.com/office/2006/metadata/properties" xmlns:ns3="8d5dcd13-9b93-4860-8686-258dec0e23be" targetNamespace="http://schemas.microsoft.com/office/2006/metadata/properties" ma:root="true" ma:fieldsID="28cc82626ae761b4ac7541494d6f1d1e" ns3:_="">
     <xsd:import namespace="8d5dcd13-9b93-4860-8686-258dec0e23be"/>
@@ -10794,24 +10851,31 @@
 </ct:contentTypeSchema>
 </file>
 
-<file path=customXml/item2.xml><?xml version="1.0" encoding="utf-8"?>
-<?mso-contentType ?>
-<FormTemplates xmlns="http://schemas.microsoft.com/sharepoint/v3/contenttype/forms">
-  <Display>DocumentLibraryForm</Display>
-  <Edit>DocumentLibraryForm</Edit>
-  <New>DocumentLibraryForm</New>
-</FormTemplates>
+<file path=customXml/itemProps1.xml><?xml version="1.0" encoding="utf-8"?>
+<ds:datastoreItem xmlns:ds="http://schemas.openxmlformats.org/officeDocument/2006/customXml" ds:itemID="{6BE63DC0-0E79-4D45-AB99-081F8145E24C}">
+  <ds:schemaRefs>
+    <ds:schemaRef ds:uri="http://purl.org/dc/terms/"/>
+    <ds:schemaRef ds:uri="http://schemas.microsoft.com/office/infopath/2007/PartnerControls"/>
+    <ds:schemaRef ds:uri="http://schemas.openxmlformats.org/package/2006/metadata/core-properties"/>
+    <ds:schemaRef ds:uri="http://purl.org/dc/elements/1.1/"/>
+    <ds:schemaRef ds:uri="http://schemas.microsoft.com/office/2006/documentManagement/types"/>
+    <ds:schemaRef ds:uri="http://www.w3.org/XML/1998/namespace"/>
+    <ds:schemaRef ds:uri="8d5dcd13-9b93-4860-8686-258dec0e23be"/>
+    <ds:schemaRef ds:uri="http://schemas.microsoft.com/office/2006/metadata/properties"/>
+    <ds:schemaRef ds:uri="http://purl.org/dc/dcmitype/"/>
+  </ds:schemaRefs>
+</ds:datastoreItem>
 </file>
 
-<file path=customXml/item3.xml><?xml version="1.0" encoding="utf-8"?>
-<p:properties xmlns:p="http://schemas.microsoft.com/office/2006/metadata/properties" xmlns:xsi="http://www.w3.org/2001/XMLSchema-instance" xmlns:pc="http://schemas.microsoft.com/office/infopath/2007/PartnerControls">
-  <documentManagement>
-    <_activity xmlns="8d5dcd13-9b93-4860-8686-258dec0e23be" xsi:nil="true"/>
-  </documentManagement>
-</p:properties>
+<file path=customXml/itemProps2.xml><?xml version="1.0" encoding="utf-8"?>
+<ds:datastoreItem xmlns:ds="http://schemas.openxmlformats.org/officeDocument/2006/customXml" ds:itemID="{33D4CFAA-434D-4462-B62D-1E23E4045646}">
+  <ds:schemaRefs>
+    <ds:schemaRef ds:uri="http://schemas.microsoft.com/sharepoint/v3/contenttype/forms"/>
+  </ds:schemaRefs>
+</ds:datastoreItem>
 </file>
 
-<file path=customXml/itemProps1.xml><?xml version="1.0" encoding="utf-8"?>
+<file path=customXml/itemProps3.xml><?xml version="1.0" encoding="utf-8"?>
 <ds:datastoreItem xmlns:ds="http://schemas.openxmlformats.org/officeDocument/2006/customXml" ds:itemID="{7685628E-9CEE-488E-843E-DA0262089D08}">
   <ds:schemaRefs>
     <ds:schemaRef ds:uri="http://schemas.microsoft.com/office/2006/metadata/contentType"/>
@@ -10827,28 +10891,4 @@
     <ds:schemaRef ds:uri="http://schemas.microsoft.com/internal/obd"/>
   </ds:schemaRefs>
 </ds:datastoreItem>
-</file>
-
-<file path=customXml/itemProps2.xml><?xml version="1.0" encoding="utf-8"?>
-<ds:datastoreItem xmlns:ds="http://schemas.openxmlformats.org/officeDocument/2006/customXml" ds:itemID="{33D4CFAA-434D-4462-B62D-1E23E4045646}">
-  <ds:schemaRefs>
-    <ds:schemaRef ds:uri="http://schemas.microsoft.com/sharepoint/v3/contenttype/forms"/>
-  </ds:schemaRefs>
-</ds:datastoreItem>
-</file>
-
-<file path=customXml/itemProps3.xml><?xml version="1.0" encoding="utf-8"?>
-<ds:datastoreItem xmlns:ds="http://schemas.openxmlformats.org/officeDocument/2006/customXml" ds:itemID="{6BE63DC0-0E79-4D45-AB99-081F8145E24C}">
-  <ds:schemaRefs>
-    <ds:schemaRef ds:uri="http://purl.org/dc/terms/"/>
-    <ds:schemaRef ds:uri="http://schemas.microsoft.com/office/infopath/2007/PartnerControls"/>
-    <ds:schemaRef ds:uri="http://schemas.openxmlformats.org/package/2006/metadata/core-properties"/>
-    <ds:schemaRef ds:uri="http://purl.org/dc/elements/1.1/"/>
-    <ds:schemaRef ds:uri="http://schemas.microsoft.com/office/2006/documentManagement/types"/>
-    <ds:schemaRef ds:uri="http://www.w3.org/XML/1998/namespace"/>
-    <ds:schemaRef ds:uri="8d5dcd13-9b93-4860-8686-258dec0e23be"/>
-    <ds:schemaRef ds:uri="http://schemas.microsoft.com/office/2006/metadata/properties"/>
-    <ds:schemaRef ds:uri="http://purl.org/dc/dcmitype/"/>
-  </ds:schemaRefs>
-</ds:datastoreItem>
 </file>
</xml_diff>

<commit_message>
Bijna laatste versie presentatie Sprint review 0
</commit_message>
<xml_diff>
--- a/Presentaties/Sprint 1.pptx
+++ b/Presentaties/Sprint 1.pptx
@@ -9638,12 +9638,6 @@
           </a:p>
           <a:p>
             <a:r>
-              <a:rPr lang="nl-NL" dirty="0"/>
-              <a:t>Samenwerkingsovereenkomst</a:t>
-            </a:r>
-          </a:p>
-          <a:p>
-            <a:r>
               <a:rPr lang="nl-NL" dirty="0" err="1"/>
               <a:t>Requirements</a:t>
             </a:r>
@@ -10641,23 +10635,6 @@
 </file>
 
 <file path=customXml/item1.xml><?xml version="1.0" encoding="utf-8"?>
-<p:properties xmlns:p="http://schemas.microsoft.com/office/2006/metadata/properties" xmlns:xsi="http://www.w3.org/2001/XMLSchema-instance" xmlns:pc="http://schemas.microsoft.com/office/infopath/2007/PartnerControls">
-  <documentManagement>
-    <_activity xmlns="8d5dcd13-9b93-4860-8686-258dec0e23be" xsi:nil="true"/>
-  </documentManagement>
-</p:properties>
-</file>
-
-<file path=customXml/item2.xml><?xml version="1.0" encoding="utf-8"?>
-<?mso-contentType ?>
-<FormTemplates xmlns="http://schemas.microsoft.com/sharepoint/v3/contenttype/forms">
-  <Display>DocumentLibraryForm</Display>
-  <Edit>DocumentLibraryForm</Edit>
-  <New>DocumentLibraryForm</New>
-</FormTemplates>
-</file>
-
-<file path=customXml/item3.xml><?xml version="1.0" encoding="utf-8"?>
 <ct:contentTypeSchema xmlns:ct="http://schemas.microsoft.com/office/2006/metadata/contentType" xmlns:ma="http://schemas.microsoft.com/office/2006/metadata/properties/metaAttributes" ct:_="" ma:_="" ma:contentTypeName="Document" ma:contentTypeID="0x01010079D7DB9D69D51D4199EBB83E098F6C13" ma:contentTypeVersion="12" ma:contentTypeDescription="Create a new document." ma:contentTypeScope="" ma:versionID="ceb163bb5f87e201cdc653da3b4d8be7">
   <xsd:schema xmlns:xsd="http://www.w3.org/2001/XMLSchema" xmlns:xs="http://www.w3.org/2001/XMLSchema" xmlns:p="http://schemas.microsoft.com/office/2006/metadata/properties" xmlns:ns3="8d5dcd13-9b93-4860-8686-258dec0e23be" targetNamespace="http://schemas.microsoft.com/office/2006/metadata/properties" ma:root="true" ma:fieldsID="28cc82626ae761b4ac7541494d6f1d1e" ns3:_="">
     <xsd:import namespace="8d5dcd13-9b93-4860-8686-258dec0e23be"/>
@@ -10851,31 +10828,24 @@
 </ct:contentTypeSchema>
 </file>
 
-<file path=customXml/itemProps1.xml><?xml version="1.0" encoding="utf-8"?>
-<ds:datastoreItem xmlns:ds="http://schemas.openxmlformats.org/officeDocument/2006/customXml" ds:itemID="{6BE63DC0-0E79-4D45-AB99-081F8145E24C}">
-  <ds:schemaRefs>
-    <ds:schemaRef ds:uri="http://purl.org/dc/terms/"/>
-    <ds:schemaRef ds:uri="http://schemas.microsoft.com/office/infopath/2007/PartnerControls"/>
-    <ds:schemaRef ds:uri="http://schemas.openxmlformats.org/package/2006/metadata/core-properties"/>
-    <ds:schemaRef ds:uri="http://purl.org/dc/elements/1.1/"/>
-    <ds:schemaRef ds:uri="http://schemas.microsoft.com/office/2006/documentManagement/types"/>
-    <ds:schemaRef ds:uri="http://www.w3.org/XML/1998/namespace"/>
-    <ds:schemaRef ds:uri="8d5dcd13-9b93-4860-8686-258dec0e23be"/>
-    <ds:schemaRef ds:uri="http://schemas.microsoft.com/office/2006/metadata/properties"/>
-    <ds:schemaRef ds:uri="http://purl.org/dc/dcmitype/"/>
-  </ds:schemaRefs>
-</ds:datastoreItem>
+<file path=customXml/item2.xml><?xml version="1.0" encoding="utf-8"?>
+<?mso-contentType ?>
+<FormTemplates xmlns="http://schemas.microsoft.com/sharepoint/v3/contenttype/forms">
+  <Display>DocumentLibraryForm</Display>
+  <Edit>DocumentLibraryForm</Edit>
+  <New>DocumentLibraryForm</New>
+</FormTemplates>
 </file>
 
-<file path=customXml/itemProps2.xml><?xml version="1.0" encoding="utf-8"?>
-<ds:datastoreItem xmlns:ds="http://schemas.openxmlformats.org/officeDocument/2006/customXml" ds:itemID="{33D4CFAA-434D-4462-B62D-1E23E4045646}">
-  <ds:schemaRefs>
-    <ds:schemaRef ds:uri="http://schemas.microsoft.com/sharepoint/v3/contenttype/forms"/>
-  </ds:schemaRefs>
-</ds:datastoreItem>
+<file path=customXml/item3.xml><?xml version="1.0" encoding="utf-8"?>
+<p:properties xmlns:p="http://schemas.microsoft.com/office/2006/metadata/properties" xmlns:xsi="http://www.w3.org/2001/XMLSchema-instance" xmlns:pc="http://schemas.microsoft.com/office/infopath/2007/PartnerControls">
+  <documentManagement>
+    <_activity xmlns="8d5dcd13-9b93-4860-8686-258dec0e23be" xsi:nil="true"/>
+  </documentManagement>
+</p:properties>
 </file>
 
-<file path=customXml/itemProps3.xml><?xml version="1.0" encoding="utf-8"?>
+<file path=customXml/itemProps1.xml><?xml version="1.0" encoding="utf-8"?>
 <ds:datastoreItem xmlns:ds="http://schemas.openxmlformats.org/officeDocument/2006/customXml" ds:itemID="{7685628E-9CEE-488E-843E-DA0262089D08}">
   <ds:schemaRefs>
     <ds:schemaRef ds:uri="http://schemas.microsoft.com/office/2006/metadata/contentType"/>
@@ -10891,4 +10861,28 @@
     <ds:schemaRef ds:uri="http://schemas.microsoft.com/internal/obd"/>
   </ds:schemaRefs>
 </ds:datastoreItem>
+</file>
+
+<file path=customXml/itemProps2.xml><?xml version="1.0" encoding="utf-8"?>
+<ds:datastoreItem xmlns:ds="http://schemas.openxmlformats.org/officeDocument/2006/customXml" ds:itemID="{33D4CFAA-434D-4462-B62D-1E23E4045646}">
+  <ds:schemaRefs>
+    <ds:schemaRef ds:uri="http://schemas.microsoft.com/sharepoint/v3/contenttype/forms"/>
+  </ds:schemaRefs>
+</ds:datastoreItem>
+</file>
+
+<file path=customXml/itemProps3.xml><?xml version="1.0" encoding="utf-8"?>
+<ds:datastoreItem xmlns:ds="http://schemas.openxmlformats.org/officeDocument/2006/customXml" ds:itemID="{6BE63DC0-0E79-4D45-AB99-081F8145E24C}">
+  <ds:schemaRefs>
+    <ds:schemaRef ds:uri="http://purl.org/dc/terms/"/>
+    <ds:schemaRef ds:uri="http://schemas.microsoft.com/office/infopath/2007/PartnerControls"/>
+    <ds:schemaRef ds:uri="http://schemas.openxmlformats.org/package/2006/metadata/core-properties"/>
+    <ds:schemaRef ds:uri="http://purl.org/dc/elements/1.1/"/>
+    <ds:schemaRef ds:uri="http://schemas.microsoft.com/office/2006/documentManagement/types"/>
+    <ds:schemaRef ds:uri="http://www.w3.org/XML/1998/namespace"/>
+    <ds:schemaRef ds:uri="8d5dcd13-9b93-4860-8686-258dec0e23be"/>
+    <ds:schemaRef ds:uri="http://schemas.microsoft.com/office/2006/metadata/properties"/>
+    <ds:schemaRef ds:uri="http://purl.org/dc/dcmitype/"/>
+  </ds:schemaRefs>
+</ds:datastoreItem>
 </file>
</xml_diff>

<commit_message>
pushen gekregen informatie van Haagse student
</commit_message>
<xml_diff>
--- a/Presentaties/Sprint 1.pptx
+++ b/Presentaties/Sprint 1.pptx
@@ -3667,7 +3667,7 @@
           <a:p>
             <a:fld id="{D5EC4132-83FF-430E-8473-4C6C1D8D7455}" type="slidenum">
               <a:rPr lang="nl-NL" smtClean="0"/>
-              <a:t>‹nr.›</a:t>
+              <a:t>‹#›</a:t>
             </a:fld>
             <a:endParaRPr lang="nl-NL"/>
           </a:p>
@@ -3958,7 +3958,7 @@
           <a:p>
             <a:fld id="{D5EC4132-83FF-430E-8473-4C6C1D8D7455}" type="slidenum">
               <a:rPr lang="nl-NL" smtClean="0"/>
-              <a:t>‹nr.›</a:t>
+              <a:t>‹#›</a:t>
             </a:fld>
             <a:endParaRPr lang="nl-NL"/>
           </a:p>
@@ -4217,7 +4217,7 @@
           <a:p>
             <a:fld id="{D5EC4132-83FF-430E-8473-4C6C1D8D7455}" type="slidenum">
               <a:rPr lang="nl-NL" smtClean="0"/>
-              <a:t>‹nr.›</a:t>
+              <a:t>‹#›</a:t>
             </a:fld>
             <a:endParaRPr lang="nl-NL"/>
           </a:p>
@@ -4686,7 +4686,7 @@
           <a:p>
             <a:fld id="{D5EC4132-83FF-430E-8473-4C6C1D8D7455}" type="slidenum">
               <a:rPr lang="nl-NL" smtClean="0"/>
-              <a:t>‹nr.›</a:t>
+              <a:t>‹#›</a:t>
             </a:fld>
             <a:endParaRPr lang="nl-NL"/>
           </a:p>
@@ -4866,7 +4866,7 @@
           <a:p>
             <a:fld id="{D5EC4132-83FF-430E-8473-4C6C1D8D7455}" type="slidenum">
               <a:rPr lang="nl-NL" smtClean="0"/>
-              <a:t>‹nr.›</a:t>
+              <a:t>‹#›</a:t>
             </a:fld>
             <a:endParaRPr lang="nl-NL"/>
           </a:p>
@@ -5442,7 +5442,7 @@
           <a:p>
             <a:fld id="{D5EC4132-83FF-430E-8473-4C6C1D8D7455}" type="slidenum">
               <a:rPr lang="nl-NL" smtClean="0"/>
-              <a:t>‹nr.›</a:t>
+              <a:t>‹#›</a:t>
             </a:fld>
             <a:endParaRPr lang="nl-NL"/>
           </a:p>
@@ -5774,7 +5774,7 @@
           <a:p>
             <a:fld id="{D5EC4132-83FF-430E-8473-4C6C1D8D7455}" type="slidenum">
               <a:rPr lang="nl-NL" smtClean="0"/>
-              <a:t>‹nr.›</a:t>
+              <a:t>‹#›</a:t>
             </a:fld>
             <a:endParaRPr lang="nl-NL"/>
           </a:p>
@@ -5949,7 +5949,7 @@
           <a:p>
             <a:fld id="{D5EC4132-83FF-430E-8473-4C6C1D8D7455}" type="slidenum">
               <a:rPr lang="nl-NL" smtClean="0"/>
-              <a:t>‹nr.›</a:t>
+              <a:t>‹#›</a:t>
             </a:fld>
             <a:endParaRPr lang="nl-NL"/>
           </a:p>
@@ -6129,7 +6129,7 @@
           <a:p>
             <a:fld id="{D5EC4132-83FF-430E-8473-4C6C1D8D7455}" type="slidenum">
               <a:rPr lang="nl-NL" smtClean="0"/>
-              <a:t>‹nr.›</a:t>
+              <a:t>‹#›</a:t>
             </a:fld>
             <a:endParaRPr lang="nl-NL"/>
           </a:p>
@@ -6299,7 +6299,7 @@
           <a:p>
             <a:fld id="{D5EC4132-83FF-430E-8473-4C6C1D8D7455}" type="slidenum">
               <a:rPr lang="nl-NL" smtClean="0"/>
-              <a:t>‹nr.›</a:t>
+              <a:t>‹#›</a:t>
             </a:fld>
             <a:endParaRPr lang="nl-NL"/>
           </a:p>
@@ -6556,7 +6556,7 @@
           <a:p>
             <a:fld id="{D5EC4132-83FF-430E-8473-4C6C1D8D7455}" type="slidenum">
               <a:rPr lang="nl-NL" smtClean="0"/>
-              <a:t>‹nr.›</a:t>
+              <a:t>‹#›</a:t>
             </a:fld>
             <a:endParaRPr lang="nl-NL"/>
           </a:p>
@@ -6848,7 +6848,7 @@
           <a:p>
             <a:fld id="{D5EC4132-83FF-430E-8473-4C6C1D8D7455}" type="slidenum">
               <a:rPr lang="nl-NL" smtClean="0"/>
-              <a:t>‹nr.›</a:t>
+              <a:t>‹#›</a:t>
             </a:fld>
             <a:endParaRPr lang="nl-NL"/>
           </a:p>
@@ -7278,7 +7278,7 @@
           <a:p>
             <a:fld id="{D5EC4132-83FF-430E-8473-4C6C1D8D7455}" type="slidenum">
               <a:rPr lang="nl-NL" smtClean="0"/>
-              <a:t>‹nr.›</a:t>
+              <a:t>‹#›</a:t>
             </a:fld>
             <a:endParaRPr lang="nl-NL"/>
           </a:p>
@@ -7396,7 +7396,7 @@
           <a:p>
             <a:fld id="{D5EC4132-83FF-430E-8473-4C6C1D8D7455}" type="slidenum">
               <a:rPr lang="nl-NL" smtClean="0"/>
-              <a:t>‹nr.›</a:t>
+              <a:t>‹#›</a:t>
             </a:fld>
             <a:endParaRPr lang="nl-NL"/>
           </a:p>
@@ -7491,7 +7491,7 @@
           <a:p>
             <a:fld id="{D5EC4132-83FF-430E-8473-4C6C1D8D7455}" type="slidenum">
               <a:rPr lang="nl-NL" smtClean="0"/>
-              <a:t>‹nr.›</a:t>
+              <a:t>‹#›</a:t>
             </a:fld>
             <a:endParaRPr lang="nl-NL"/>
           </a:p>
@@ -7774,7 +7774,7 @@
           <a:p>
             <a:fld id="{D5EC4132-83FF-430E-8473-4C6C1D8D7455}" type="slidenum">
               <a:rPr lang="nl-NL" smtClean="0"/>
-              <a:t>‹nr.›</a:t>
+              <a:t>‹#›</a:t>
             </a:fld>
             <a:endParaRPr lang="nl-NL"/>
           </a:p>
@@ -8075,7 +8075,7 @@
           <a:p>
             <a:fld id="{D5EC4132-83FF-430E-8473-4C6C1D8D7455}" type="slidenum">
               <a:rPr lang="nl-NL" smtClean="0"/>
-              <a:t>‹nr.›</a:t>
+              <a:t>‹#›</a:t>
             </a:fld>
             <a:endParaRPr lang="nl-NL"/>
           </a:p>
@@ -8348,7 +8348,7 @@
           <a:p>
             <a:fld id="{D5EC4132-83FF-430E-8473-4C6C1D8D7455}" type="slidenum">
               <a:rPr lang="nl-NL" smtClean="0"/>
-              <a:t>‹nr.›</a:t>
+              <a:t>‹#›</a:t>
             </a:fld>
             <a:endParaRPr lang="nl-NL"/>
           </a:p>
@@ -10891,6 +10891,23 @@
 </file>
 
 <file path=customXml/item1.xml><?xml version="1.0" encoding="utf-8"?>
+<p:properties xmlns:p="http://schemas.microsoft.com/office/2006/metadata/properties" xmlns:xsi="http://www.w3.org/2001/XMLSchema-instance" xmlns:pc="http://schemas.microsoft.com/office/infopath/2007/PartnerControls">
+  <documentManagement>
+    <_activity xmlns="8d5dcd13-9b93-4860-8686-258dec0e23be" xsi:nil="true"/>
+  </documentManagement>
+</p:properties>
+</file>
+
+<file path=customXml/item2.xml><?xml version="1.0" encoding="utf-8"?>
+<?mso-contentType ?>
+<FormTemplates xmlns="http://schemas.microsoft.com/sharepoint/v3/contenttype/forms">
+  <Display>DocumentLibraryForm</Display>
+  <Edit>DocumentLibraryForm</Edit>
+  <New>DocumentLibraryForm</New>
+</FormTemplates>
+</file>
+
+<file path=customXml/item3.xml><?xml version="1.0" encoding="utf-8"?>
 <ct:contentTypeSchema xmlns:ct="http://schemas.microsoft.com/office/2006/metadata/contentType" xmlns:ma="http://schemas.microsoft.com/office/2006/metadata/properties/metaAttributes" ct:_="" ma:_="" ma:contentTypeName="Document" ma:contentTypeID="0x01010079D7DB9D69D51D4199EBB83E098F6C13" ma:contentTypeVersion="12" ma:contentTypeDescription="Create a new document." ma:contentTypeScope="" ma:versionID="ceb163bb5f87e201cdc653da3b4d8be7">
   <xsd:schema xmlns:xsd="http://www.w3.org/2001/XMLSchema" xmlns:xs="http://www.w3.org/2001/XMLSchema" xmlns:p="http://schemas.microsoft.com/office/2006/metadata/properties" xmlns:ns3="8d5dcd13-9b93-4860-8686-258dec0e23be" targetNamespace="http://schemas.microsoft.com/office/2006/metadata/properties" ma:root="true" ma:fieldsID="28cc82626ae761b4ac7541494d6f1d1e" ns3:_="">
     <xsd:import namespace="8d5dcd13-9b93-4860-8686-258dec0e23be"/>
@@ -11084,24 +11101,31 @@
 </ct:contentTypeSchema>
 </file>
 
-<file path=customXml/item2.xml><?xml version="1.0" encoding="utf-8"?>
-<?mso-contentType ?>
-<FormTemplates xmlns="http://schemas.microsoft.com/sharepoint/v3/contenttype/forms">
-  <Display>DocumentLibraryForm</Display>
-  <Edit>DocumentLibraryForm</Edit>
-  <New>DocumentLibraryForm</New>
-</FormTemplates>
+<file path=customXml/itemProps1.xml><?xml version="1.0" encoding="utf-8"?>
+<ds:datastoreItem xmlns:ds="http://schemas.openxmlformats.org/officeDocument/2006/customXml" ds:itemID="{6BE63DC0-0E79-4D45-AB99-081F8145E24C}">
+  <ds:schemaRefs>
+    <ds:schemaRef ds:uri="http://purl.org/dc/terms/"/>
+    <ds:schemaRef ds:uri="http://schemas.microsoft.com/office/infopath/2007/PartnerControls"/>
+    <ds:schemaRef ds:uri="http://schemas.openxmlformats.org/package/2006/metadata/core-properties"/>
+    <ds:schemaRef ds:uri="http://purl.org/dc/elements/1.1/"/>
+    <ds:schemaRef ds:uri="http://schemas.microsoft.com/office/2006/documentManagement/types"/>
+    <ds:schemaRef ds:uri="http://www.w3.org/XML/1998/namespace"/>
+    <ds:schemaRef ds:uri="8d5dcd13-9b93-4860-8686-258dec0e23be"/>
+    <ds:schemaRef ds:uri="http://schemas.microsoft.com/office/2006/metadata/properties"/>
+    <ds:schemaRef ds:uri="http://purl.org/dc/dcmitype/"/>
+  </ds:schemaRefs>
+</ds:datastoreItem>
 </file>
 
-<file path=customXml/item3.xml><?xml version="1.0" encoding="utf-8"?>
-<p:properties xmlns:p="http://schemas.microsoft.com/office/2006/metadata/properties" xmlns:xsi="http://www.w3.org/2001/XMLSchema-instance" xmlns:pc="http://schemas.microsoft.com/office/infopath/2007/PartnerControls">
-  <documentManagement>
-    <_activity xmlns="8d5dcd13-9b93-4860-8686-258dec0e23be" xsi:nil="true"/>
-  </documentManagement>
-</p:properties>
+<file path=customXml/itemProps2.xml><?xml version="1.0" encoding="utf-8"?>
+<ds:datastoreItem xmlns:ds="http://schemas.openxmlformats.org/officeDocument/2006/customXml" ds:itemID="{33D4CFAA-434D-4462-B62D-1E23E4045646}">
+  <ds:schemaRefs>
+    <ds:schemaRef ds:uri="http://schemas.microsoft.com/sharepoint/v3/contenttype/forms"/>
+  </ds:schemaRefs>
+</ds:datastoreItem>
 </file>
 
-<file path=customXml/itemProps1.xml><?xml version="1.0" encoding="utf-8"?>
+<file path=customXml/itemProps3.xml><?xml version="1.0" encoding="utf-8"?>
 <ds:datastoreItem xmlns:ds="http://schemas.openxmlformats.org/officeDocument/2006/customXml" ds:itemID="{7685628E-9CEE-488E-843E-DA0262089D08}">
   <ds:schemaRefs>
     <ds:schemaRef ds:uri="http://schemas.microsoft.com/office/2006/metadata/contentType"/>
@@ -11117,28 +11141,4 @@
     <ds:schemaRef ds:uri="http://schemas.microsoft.com/internal/obd"/>
   </ds:schemaRefs>
 </ds:datastoreItem>
-</file>
-
-<file path=customXml/itemProps2.xml><?xml version="1.0" encoding="utf-8"?>
-<ds:datastoreItem xmlns:ds="http://schemas.openxmlformats.org/officeDocument/2006/customXml" ds:itemID="{33D4CFAA-434D-4462-B62D-1E23E4045646}">
-  <ds:schemaRefs>
-    <ds:schemaRef ds:uri="http://schemas.microsoft.com/sharepoint/v3/contenttype/forms"/>
-  </ds:schemaRefs>
-</ds:datastoreItem>
-</file>
-
-<file path=customXml/itemProps3.xml><?xml version="1.0" encoding="utf-8"?>
-<ds:datastoreItem xmlns:ds="http://schemas.openxmlformats.org/officeDocument/2006/customXml" ds:itemID="{6BE63DC0-0E79-4D45-AB99-081F8145E24C}">
-  <ds:schemaRefs>
-    <ds:schemaRef ds:uri="http://purl.org/dc/terms/"/>
-    <ds:schemaRef ds:uri="http://schemas.microsoft.com/office/infopath/2007/PartnerControls"/>
-    <ds:schemaRef ds:uri="http://schemas.openxmlformats.org/package/2006/metadata/core-properties"/>
-    <ds:schemaRef ds:uri="http://purl.org/dc/elements/1.1/"/>
-    <ds:schemaRef ds:uri="http://schemas.microsoft.com/office/2006/documentManagement/types"/>
-    <ds:schemaRef ds:uri="http://www.w3.org/XML/1998/namespace"/>
-    <ds:schemaRef ds:uri="8d5dcd13-9b93-4860-8686-258dec0e23be"/>
-    <ds:schemaRef ds:uri="http://schemas.microsoft.com/office/2006/metadata/properties"/>
-    <ds:schemaRef ds:uri="http://purl.org/dc/dcmitype/"/>
-  </ds:schemaRefs>
-</ds:datastoreItem>
 </file>
</xml_diff>